<commit_message>
1st version of the PPT completed
</commit_message>
<xml_diff>
--- a/DEFENSA/Defensa_Arturo_Velez.pptx
+++ b/DEFENSA/Defensa_Arturo_Velez.pptx
@@ -864,8 +864,26 @@
           <a:p>
             <a:r>
               <a:rPr lang="es-ES" baseline="0" dirty="0" smtClean="0"/>
-              <a:t>-Pruebas para validar</a:t>
-            </a:r>
+              <a:t>-Pruebas para </a:t>
+            </a:r>
+            <a:r>
+              <a:rPr lang="es-ES" baseline="0" dirty="0" smtClean="0"/>
+              <a:t>validar</a:t>
+            </a:r>
+          </a:p>
+          <a:p>
+            <a:endParaRPr lang="es-ES" baseline="0" dirty="0" smtClean="0"/>
+          </a:p>
+          <a:p>
+            <a:r>
+              <a:rPr lang="es-ES" baseline="0" dirty="0" smtClean="0"/>
+              <a:t>- Empleado </a:t>
+            </a:r>
+            <a:r>
+              <a:rPr lang="es-ES" baseline="0" dirty="0" err="1" smtClean="0"/>
+              <a:t>JdeRobot</a:t>
+            </a:r>
+            <a:endParaRPr lang="es-ES" baseline="0" dirty="0" smtClean="0"/>
           </a:p>
           <a:p>
             <a:endParaRPr lang="es-ES" dirty="0"/>
@@ -1112,10 +1130,9 @@
           </a:p>
           <a:p>
             <a:r>
-              <a:rPr lang="es-ES" smtClean="0"/>
+              <a:rPr lang="es-ES" dirty="0" smtClean="0"/>
               <a:t>-Búsqueda</a:t>
             </a:r>
-            <a:endParaRPr lang="es-ES" dirty="0" smtClean="0"/>
           </a:p>
           <a:p>
             <a:r>
@@ -1150,7 +1167,41 @@
               <a:rPr lang="es-ES" baseline="0" dirty="0" smtClean="0"/>
               <a:t>	- Mantiene altura y no gira entorno a eje z</a:t>
             </a:r>
-            <a:endParaRPr lang="es-ES" dirty="0"/>
+          </a:p>
+          <a:p>
+            <a:r>
+              <a:rPr lang="es-ES" baseline="0" dirty="0" smtClean="0"/>
+              <a:t>-Seguimiento</a:t>
+            </a:r>
+          </a:p>
+          <a:p>
+            <a:r>
+              <a:rPr lang="es-ES" baseline="0" dirty="0" smtClean="0"/>
+              <a:t>	- Calcula el error con el centro de la imagen</a:t>
+            </a:r>
+            <a:endParaRPr lang="es-ES" baseline="0" dirty="0"/>
+          </a:p>
+          <a:p>
+            <a:r>
+              <a:rPr lang="es-ES" baseline="0" dirty="0" smtClean="0"/>
+              <a:t>- Todo gobernado con la </a:t>
+            </a:r>
+            <a:r>
+              <a:rPr lang="es-ES" baseline="0" dirty="0" err="1" smtClean="0"/>
+              <a:t>funcion</a:t>
+            </a:r>
+            <a:r>
+              <a:rPr lang="es-ES" baseline="0" dirty="0" smtClean="0"/>
+              <a:t> </a:t>
+            </a:r>
+            <a:r>
+              <a:rPr lang="es-ES" baseline="0" dirty="0" err="1" smtClean="0"/>
+              <a:t>cmdvel</a:t>
+            </a:r>
+            <a:r>
+              <a:rPr lang="es-ES" baseline="0" dirty="0" smtClean="0"/>
+              <a:t> del interfaz ICE</a:t>
+            </a:r>
           </a:p>
         </p:txBody>
       </p:sp>
@@ -1181,6 +1232,412 @@
     <p:extLst>
       <p:ext uri="{BB962C8B-B14F-4D97-AF65-F5344CB8AC3E}">
         <p14:creationId xmlns:p14="http://schemas.microsoft.com/office/powerpoint/2010/main" val="1207026177"/>
+      </p:ext>
+    </p:extLst>
+  </p:cSld>
+  <p:clrMapOvr>
+    <a:masterClrMapping/>
+  </p:clrMapOvr>
+</p:notes>
+</file>
+
+<file path=ppt/notesSlides/notesSlide6.xml><?xml version="1.0" encoding="utf-8"?>
+<p:notes xmlns:a="http://schemas.openxmlformats.org/drawingml/2006/main" xmlns:r="http://schemas.openxmlformats.org/officeDocument/2006/relationships" xmlns:p="http://schemas.openxmlformats.org/presentationml/2006/main">
+  <p:cSld>
+    <p:spTree>
+      <p:nvGrpSpPr>
+        <p:cNvPr id="1" name=""/>
+        <p:cNvGrpSpPr/>
+        <p:nvPr/>
+      </p:nvGrpSpPr>
+      <p:grpSpPr>
+        <a:xfrm>
+          <a:off x="0" y="0"/>
+          <a:ext cx="0" cy="0"/>
+          <a:chOff x="0" y="0"/>
+          <a:chExt cx="0" cy="0"/>
+        </a:xfrm>
+      </p:grpSpPr>
+      <p:sp>
+        <p:nvSpPr>
+          <p:cNvPr id="2" name="Marcador de imagen de diapositiva 1"/>
+          <p:cNvSpPr>
+            <a:spLocks noGrp="1" noRot="1" noChangeAspect="1"/>
+          </p:cNvSpPr>
+          <p:nvPr>
+            <p:ph type="sldImg"/>
+          </p:nvPr>
+        </p:nvSpPr>
+        <p:spPr/>
+      </p:sp>
+      <p:sp>
+        <p:nvSpPr>
+          <p:cNvPr id="3" name="Marcador de notas 2"/>
+          <p:cNvSpPr>
+            <a:spLocks noGrp="1"/>
+          </p:cNvSpPr>
+          <p:nvPr>
+            <p:ph type="body" idx="1"/>
+          </p:nvPr>
+        </p:nvSpPr>
+        <p:spPr/>
+        <p:txBody>
+          <a:bodyPr/>
+          <a:lstStyle/>
+          <a:p>
+            <a:r>
+              <a:rPr lang="es-ES" dirty="0" smtClean="0"/>
+              <a:t>-Ejecución</a:t>
+            </a:r>
+            <a:r>
+              <a:rPr lang="es-ES" baseline="0" dirty="0" smtClean="0"/>
+              <a:t> habitual</a:t>
+            </a:r>
+          </a:p>
+          <a:p>
+            <a:r>
+              <a:rPr lang="es-ES" baseline="0" dirty="0" smtClean="0"/>
+              <a:t>	- Despegue con el </a:t>
+            </a:r>
+            <a:r>
+              <a:rPr lang="es-ES" baseline="0" dirty="0" err="1" smtClean="0"/>
+              <a:t>boton</a:t>
+            </a:r>
+            <a:r>
+              <a:rPr lang="es-ES" baseline="0" dirty="0" smtClean="0"/>
+              <a:t> del interfaz</a:t>
+            </a:r>
+          </a:p>
+          <a:p>
+            <a:r>
+              <a:rPr lang="es-ES" baseline="0" dirty="0" smtClean="0"/>
+              <a:t>	- Play</a:t>
+            </a:r>
+          </a:p>
+          <a:p>
+            <a:r>
+              <a:rPr lang="es-ES" baseline="0" dirty="0" smtClean="0"/>
+              <a:t>	- </a:t>
+            </a:r>
+            <a:r>
+              <a:rPr lang="es-ES" baseline="0" dirty="0" err="1" smtClean="0"/>
+              <a:t>Busqueda</a:t>
+            </a:r>
+            <a:r>
+              <a:rPr lang="es-ES" baseline="0" dirty="0" smtClean="0"/>
+              <a:t> en espiral </a:t>
+            </a:r>
+          </a:p>
+          <a:p>
+            <a:r>
+              <a:rPr lang="es-ES" baseline="0" dirty="0" smtClean="0"/>
+              <a:t>	- </a:t>
+            </a:r>
+            <a:r>
+              <a:rPr lang="es-ES" baseline="0" dirty="0" err="1" smtClean="0"/>
+              <a:t>Deteccion</a:t>
+            </a:r>
+            <a:r>
+              <a:rPr lang="es-ES" baseline="0" dirty="0" smtClean="0"/>
+              <a:t> de objeto</a:t>
+            </a:r>
+          </a:p>
+          <a:p>
+            <a:r>
+              <a:rPr lang="es-ES" baseline="0" dirty="0" smtClean="0"/>
+              <a:t>	- Seguimiento</a:t>
+            </a:r>
+          </a:p>
+          <a:p>
+            <a:pPr marL="171450" indent="-171450">
+              <a:buFontTx/>
+              <a:buChar char="-"/>
+            </a:pPr>
+            <a:r>
+              <a:rPr lang="es-ES" baseline="0" dirty="0" err="1" smtClean="0"/>
+              <a:t>Deteccion</a:t>
+            </a:r>
+            <a:r>
+              <a:rPr lang="es-ES" baseline="0" dirty="0" smtClean="0"/>
+              <a:t> de puntos con </a:t>
+            </a:r>
+            <a:r>
+              <a:rPr lang="es-ES" baseline="0" dirty="0" err="1" smtClean="0"/>
+              <a:t>good</a:t>
+            </a:r>
+            <a:r>
+              <a:rPr lang="es-ES" baseline="0" dirty="0" smtClean="0"/>
+              <a:t> </a:t>
+            </a:r>
+            <a:r>
+              <a:rPr lang="es-ES" baseline="0" dirty="0" err="1" smtClean="0"/>
+              <a:t>features</a:t>
+            </a:r>
+            <a:r>
+              <a:rPr lang="es-ES" baseline="0" dirty="0" smtClean="0"/>
+              <a:t> </a:t>
+            </a:r>
+            <a:r>
+              <a:rPr lang="es-ES" baseline="0" dirty="0" err="1" smtClean="0"/>
+              <a:t>to</a:t>
+            </a:r>
+            <a:r>
+              <a:rPr lang="es-ES" baseline="0" dirty="0" smtClean="0"/>
+              <a:t> </a:t>
+            </a:r>
+            <a:r>
+              <a:rPr lang="es-ES" baseline="0" dirty="0" err="1" smtClean="0"/>
+              <a:t>track</a:t>
+            </a:r>
+            <a:endParaRPr lang="es-ES" baseline="0" dirty="0" smtClean="0"/>
+          </a:p>
+          <a:p>
+            <a:pPr marL="171450" indent="-171450">
+              <a:buFontTx/>
+              <a:buChar char="-"/>
+            </a:pPr>
+            <a:r>
+              <a:rPr lang="es-ES" baseline="0" dirty="0" smtClean="0"/>
+              <a:t>Seguimiento de puntos mediante flujo </a:t>
+            </a:r>
+            <a:r>
+              <a:rPr lang="es-ES" baseline="0" dirty="0" err="1" smtClean="0"/>
+              <a:t>optico</a:t>
+            </a:r>
+            <a:endParaRPr lang="es-ES" baseline="0" dirty="0" smtClean="0"/>
+          </a:p>
+          <a:p>
+            <a:pPr marL="171450" indent="-171450">
+              <a:buFontTx/>
+              <a:buChar char="-"/>
+            </a:pPr>
+            <a:r>
+              <a:rPr lang="es-ES" baseline="0" dirty="0" err="1" smtClean="0"/>
+              <a:t>Definicion</a:t>
+            </a:r>
+            <a:r>
+              <a:rPr lang="es-ES" baseline="0" dirty="0" smtClean="0"/>
+              <a:t> de </a:t>
+            </a:r>
+            <a:r>
+              <a:rPr lang="es-ES" baseline="0" dirty="0" err="1" smtClean="0"/>
+              <a:t>roi</a:t>
+            </a:r>
+            <a:endParaRPr lang="es-ES" baseline="0" dirty="0" smtClean="0"/>
+          </a:p>
+          <a:p>
+            <a:pPr marL="171450" indent="-171450">
+              <a:buFontTx/>
+              <a:buChar char="-"/>
+            </a:pPr>
+            <a:r>
+              <a:rPr lang="es-ES" baseline="0" dirty="0" err="1" smtClean="0"/>
+              <a:t>Definicion</a:t>
+            </a:r>
+            <a:r>
+              <a:rPr lang="es-ES" baseline="0" dirty="0" smtClean="0"/>
+              <a:t> de </a:t>
+            </a:r>
+            <a:r>
+              <a:rPr lang="es-ES" baseline="0" dirty="0" err="1" smtClean="0"/>
+              <a:t>roi</a:t>
+            </a:r>
+            <a:r>
+              <a:rPr lang="es-ES" baseline="0" dirty="0" smtClean="0"/>
+              <a:t> manual para </a:t>
+            </a:r>
+            <a:r>
+              <a:rPr lang="es-ES" baseline="0" dirty="0" err="1" smtClean="0"/>
+              <a:t>deteccion</a:t>
+            </a:r>
+            <a:endParaRPr lang="es-ES" baseline="0" dirty="0" smtClean="0"/>
+          </a:p>
+          <a:p>
+            <a:pPr marL="171450" indent="-171450">
+              <a:buFontTx/>
+              <a:buChar char="-"/>
+            </a:pPr>
+            <a:r>
+              <a:rPr lang="es-ES" baseline="0" dirty="0" smtClean="0"/>
+              <a:t>Experimento con filtros de color</a:t>
+            </a:r>
+            <a:endParaRPr lang="es-ES" dirty="0"/>
+          </a:p>
+        </p:txBody>
+      </p:sp>
+      <p:sp>
+        <p:nvSpPr>
+          <p:cNvPr id="4" name="Marcador de número de diapositiva 3"/>
+          <p:cNvSpPr>
+            <a:spLocks noGrp="1"/>
+          </p:cNvSpPr>
+          <p:nvPr>
+            <p:ph type="sldNum" sz="quarter" idx="10"/>
+          </p:nvPr>
+        </p:nvSpPr>
+        <p:spPr/>
+        <p:txBody>
+          <a:bodyPr/>
+          <a:lstStyle/>
+          <a:p>
+            <a:fld id="{3077ADF8-B573-9643-9E52-27C076749DE7}" type="slidenum">
+              <a:rPr lang="es-ES" smtClean="0"/>
+              <a:t>6</a:t>
+            </a:fld>
+            <a:endParaRPr lang="es-ES"/>
+          </a:p>
+        </p:txBody>
+      </p:sp>
+    </p:spTree>
+    <p:extLst>
+      <p:ext uri="{BB962C8B-B14F-4D97-AF65-F5344CB8AC3E}">
+        <p14:creationId xmlns:p14="http://schemas.microsoft.com/office/powerpoint/2010/main" val="606047236"/>
+      </p:ext>
+    </p:extLst>
+  </p:cSld>
+  <p:clrMapOvr>
+    <a:masterClrMapping/>
+  </p:clrMapOvr>
+</p:notes>
+</file>
+
+<file path=ppt/notesSlides/notesSlide7.xml><?xml version="1.0" encoding="utf-8"?>
+<p:notes xmlns:a="http://schemas.openxmlformats.org/drawingml/2006/main" xmlns:r="http://schemas.openxmlformats.org/officeDocument/2006/relationships" xmlns:p="http://schemas.openxmlformats.org/presentationml/2006/main">
+  <p:cSld>
+    <p:spTree>
+      <p:nvGrpSpPr>
+        <p:cNvPr id="1" name=""/>
+        <p:cNvGrpSpPr/>
+        <p:nvPr/>
+      </p:nvGrpSpPr>
+      <p:grpSpPr>
+        <a:xfrm>
+          <a:off x="0" y="0"/>
+          <a:ext cx="0" cy="0"/>
+          <a:chOff x="0" y="0"/>
+          <a:chExt cx="0" cy="0"/>
+        </a:xfrm>
+      </p:grpSpPr>
+      <p:sp>
+        <p:nvSpPr>
+          <p:cNvPr id="2" name="Marcador de imagen de diapositiva 1"/>
+          <p:cNvSpPr>
+            <a:spLocks noGrp="1" noRot="1" noChangeAspect="1"/>
+          </p:cNvSpPr>
+          <p:nvPr>
+            <p:ph type="sldImg"/>
+          </p:nvPr>
+        </p:nvSpPr>
+        <p:spPr/>
+      </p:sp>
+      <p:sp>
+        <p:nvSpPr>
+          <p:cNvPr id="3" name="Marcador de notas 2"/>
+          <p:cNvSpPr>
+            <a:spLocks noGrp="1"/>
+          </p:cNvSpPr>
+          <p:nvPr>
+            <p:ph type="body" idx="1"/>
+          </p:nvPr>
+        </p:nvSpPr>
+        <p:spPr/>
+        <p:txBody>
+          <a:bodyPr/>
+          <a:lstStyle/>
+          <a:p>
+            <a:pPr marL="171450" indent="-171450">
+              <a:buFontTx/>
+              <a:buChar char="-"/>
+            </a:pPr>
+            <a:r>
+              <a:rPr lang="es-ES" dirty="0" smtClean="0"/>
+              <a:t>Llevar el proyecto a un </a:t>
+            </a:r>
+            <a:r>
+              <a:rPr lang="es-ES" dirty="0" err="1" smtClean="0"/>
+              <a:t>drone</a:t>
+            </a:r>
+            <a:r>
+              <a:rPr lang="es-ES" dirty="0" smtClean="0"/>
+              <a:t> real</a:t>
+            </a:r>
+          </a:p>
+          <a:p>
+            <a:pPr marL="171450" indent="-171450">
+              <a:buFontTx/>
+              <a:buChar char="-"/>
+            </a:pPr>
+            <a:r>
+              <a:rPr lang="es-ES" dirty="0" smtClean="0"/>
+              <a:t>Despliegue</a:t>
+            </a:r>
+            <a:r>
+              <a:rPr lang="es-ES" baseline="0" dirty="0" smtClean="0"/>
+              <a:t> de la aplicaci</a:t>
+            </a:r>
+            <a:r>
+              <a:rPr lang="es-ES" baseline="0" dirty="0" smtClean="0"/>
+              <a:t>ón </a:t>
+            </a:r>
+          </a:p>
+          <a:p>
+            <a:pPr marL="171450" indent="-171450">
+              <a:buFontTx/>
+              <a:buChar char="-"/>
+            </a:pPr>
+            <a:r>
+              <a:rPr lang="es-ES" baseline="0" dirty="0" smtClean="0"/>
+              <a:t>Elaborar algoritmos con redes neuronales para </a:t>
+            </a:r>
+            <a:r>
+              <a:rPr lang="es-ES" baseline="0" dirty="0" err="1" smtClean="0"/>
+              <a:t>deteccion</a:t>
+            </a:r>
+            <a:r>
+              <a:rPr lang="es-ES" baseline="0" dirty="0" smtClean="0"/>
+              <a:t> de patrones</a:t>
+            </a:r>
+          </a:p>
+          <a:p>
+            <a:pPr marL="171450" indent="-171450">
+              <a:buFontTx/>
+              <a:buChar char="-"/>
+            </a:pPr>
+            <a:r>
+              <a:rPr lang="es-ES" baseline="0" dirty="0" smtClean="0"/>
+              <a:t>Aplicaciones visuales</a:t>
+            </a:r>
+            <a:endParaRPr lang="es-ES" dirty="0"/>
+          </a:p>
+        </p:txBody>
+      </p:sp>
+      <p:sp>
+        <p:nvSpPr>
+          <p:cNvPr id="4" name="Marcador de número de diapositiva 3"/>
+          <p:cNvSpPr>
+            <a:spLocks noGrp="1"/>
+          </p:cNvSpPr>
+          <p:nvPr>
+            <p:ph type="sldNum" sz="quarter" idx="10"/>
+          </p:nvPr>
+        </p:nvSpPr>
+        <p:spPr/>
+        <p:txBody>
+          <a:bodyPr/>
+          <a:lstStyle/>
+          <a:p>
+            <a:fld id="{3077ADF8-B573-9643-9E52-27C076749DE7}" type="slidenum">
+              <a:rPr lang="es-ES" smtClean="0"/>
+              <a:t>7</a:t>
+            </a:fld>
+            <a:endParaRPr lang="es-ES"/>
+          </a:p>
+        </p:txBody>
+      </p:sp>
+    </p:spTree>
+    <p:extLst>
+      <p:ext uri="{BB962C8B-B14F-4D97-AF65-F5344CB8AC3E}">
+        <p14:creationId xmlns:p14="http://schemas.microsoft.com/office/powerpoint/2010/main" val="2175426315"/>
       </p:ext>
     </p:extLst>
   </p:cSld>
@@ -5622,7 +6079,7 @@
           <p:nvPr/>
         </p:nvPicPr>
         <p:blipFill>
-          <a:blip r:embed="rId2">
+          <a:blip r:embed="rId3">
             <a:extLst>
               <a:ext uri="{28A0092B-C50C-407E-A947-70E740481C1C}">
                 <a14:useLocalDpi xmlns:a14="http://schemas.microsoft.com/office/drawing/2010/main" val="0"/>

</xml_diff>